<commit_message>
Edit README and PPT
</commit_message>
<xml_diff>
--- a/Cyclistic-Deliverables.pptx
+++ b/Cyclistic-Deliverables.pptx
@@ -129,159 +129,6 @@
 
 <file path=ppt/changesInfos/changesInfo1.xml><?xml version="1.0" encoding="utf-8"?>
 <pc:chgInfo xmlns:a="http://schemas.openxmlformats.org/drawingml/2006/main" xmlns:r="http://schemas.openxmlformats.org/officeDocument/2006/relationships" xmlns:ac="http://schemas.microsoft.com/office/drawing/2013/main/command" xmlns:pc="http://schemas.microsoft.com/office/powerpoint/2013/main/command">
-  <pc:docChgLst>
-    <pc:chgData name="Tony Fong" userId="ee6c827c74d45d47" providerId="LiveId" clId="{EA513785-A88E-45FF-9E88-79EB89A826A0}"/>
-    <pc:docChg chg="undo custSel modSld">
-      <pc:chgData name="Tony Fong" userId="ee6c827c74d45d47" providerId="LiveId" clId="{EA513785-A88E-45FF-9E88-79EB89A826A0}" dt="2021-10-19T19:46:50.820" v="50" actId="6549"/>
-      <pc:docMkLst>
-        <pc:docMk/>
-      </pc:docMkLst>
-      <pc:sldChg chg="modSp mod">
-        <pc:chgData name="Tony Fong" userId="ee6c827c74d45d47" providerId="LiveId" clId="{EA513785-A88E-45FF-9E88-79EB89A826A0}" dt="2021-10-19T19:46:50.820" v="50" actId="6549"/>
-        <pc:sldMkLst>
-          <pc:docMk/>
-          <pc:sldMk cId="2422413286" sldId="257"/>
-        </pc:sldMkLst>
-        <pc:spChg chg="mod">
-          <ac:chgData name="Tony Fong" userId="ee6c827c74d45d47" providerId="LiveId" clId="{EA513785-A88E-45FF-9E88-79EB89A826A0}" dt="2021-10-19T19:46:50.820" v="50" actId="6549"/>
-          <ac:spMkLst>
-            <pc:docMk/>
-            <pc:sldMk cId="2422413286" sldId="257"/>
-            <ac:spMk id="2" creationId="{25F644BA-AEF0-4483-A5A6-AC31D85173A2}"/>
-          </ac:spMkLst>
-        </pc:spChg>
-      </pc:sldChg>
-      <pc:sldChg chg="modSp mod">
-        <pc:chgData name="Tony Fong" userId="ee6c827c74d45d47" providerId="LiveId" clId="{EA513785-A88E-45FF-9E88-79EB89A826A0}" dt="2021-10-19T19:45:55.781" v="15" actId="20577"/>
-        <pc:sldMkLst>
-          <pc:docMk/>
-          <pc:sldMk cId="2737941546" sldId="263"/>
-        </pc:sldMkLst>
-        <pc:spChg chg="mod">
-          <ac:chgData name="Tony Fong" userId="ee6c827c74d45d47" providerId="LiveId" clId="{EA513785-A88E-45FF-9E88-79EB89A826A0}" dt="2021-10-19T19:45:55.781" v="15" actId="20577"/>
-          <ac:spMkLst>
-            <pc:docMk/>
-            <pc:sldMk cId="2737941546" sldId="263"/>
-            <ac:spMk id="3" creationId="{01A004B9-0C4D-4760-ABDE-69A7109E3584}"/>
-          </ac:spMkLst>
-        </pc:spChg>
-      </pc:sldChg>
-    </pc:docChg>
-  </pc:docChgLst>
-  <pc:docChgLst>
-    <pc:chgData name="Tony Fong" userId="ee6c827c74d45d47" providerId="LiveId" clId="{BEF34360-C258-4187-B032-9A1850E3CE0F}"/>
-    <pc:docChg chg="custSel modSld">
-      <pc:chgData name="Tony Fong" userId="ee6c827c74d45d47" providerId="LiveId" clId="{BEF34360-C258-4187-B032-9A1850E3CE0F}" dt="2021-10-04T18:34:13.236" v="779" actId="20577"/>
-      <pc:docMkLst>
-        <pc:docMk/>
-      </pc:docMkLst>
-      <pc:sldChg chg="modSp mod">
-        <pc:chgData name="Tony Fong" userId="ee6c827c74d45d47" providerId="LiveId" clId="{BEF34360-C258-4187-B032-9A1850E3CE0F}" dt="2021-10-02T21:07:07.464" v="696" actId="20577"/>
-        <pc:sldMkLst>
-          <pc:docMk/>
-          <pc:sldMk cId="2422413286" sldId="257"/>
-        </pc:sldMkLst>
-        <pc:spChg chg="mod">
-          <ac:chgData name="Tony Fong" userId="ee6c827c74d45d47" providerId="LiveId" clId="{BEF34360-C258-4187-B032-9A1850E3CE0F}" dt="2021-10-02T21:07:07.464" v="696" actId="20577"/>
-          <ac:spMkLst>
-            <pc:docMk/>
-            <pc:sldMk cId="2422413286" sldId="257"/>
-            <ac:spMk id="3" creationId="{E3590B9D-D67A-4C40-AE59-0EEF31F4BF99}"/>
-          </ac:spMkLst>
-        </pc:spChg>
-      </pc:sldChg>
-      <pc:sldChg chg="modSp mod">
-        <pc:chgData name="Tony Fong" userId="ee6c827c74d45d47" providerId="LiveId" clId="{BEF34360-C258-4187-B032-9A1850E3CE0F}" dt="2021-10-04T18:34:13.236" v="779" actId="20577"/>
-        <pc:sldMkLst>
-          <pc:docMk/>
-          <pc:sldMk cId="987459327" sldId="258"/>
-        </pc:sldMkLst>
-        <pc:spChg chg="mod">
-          <ac:chgData name="Tony Fong" userId="ee6c827c74d45d47" providerId="LiveId" clId="{BEF34360-C258-4187-B032-9A1850E3CE0F}" dt="2021-10-04T18:34:13.236" v="779" actId="20577"/>
-          <ac:spMkLst>
-            <pc:docMk/>
-            <pc:sldMk cId="987459327" sldId="258"/>
-            <ac:spMk id="3" creationId="{19A78F9D-CFFD-41FB-8546-D14F05FD77BC}"/>
-          </ac:spMkLst>
-        </pc:spChg>
-      </pc:sldChg>
-      <pc:sldChg chg="modSp mod">
-        <pc:chgData name="Tony Fong" userId="ee6c827c74d45d47" providerId="LiveId" clId="{BEF34360-C258-4187-B032-9A1850E3CE0F}" dt="2021-10-02T21:09:43.659" v="752" actId="33524"/>
-        <pc:sldMkLst>
-          <pc:docMk/>
-          <pc:sldMk cId="402239867" sldId="259"/>
-        </pc:sldMkLst>
-        <pc:spChg chg="mod">
-          <ac:chgData name="Tony Fong" userId="ee6c827c74d45d47" providerId="LiveId" clId="{BEF34360-C258-4187-B032-9A1850E3CE0F}" dt="2021-10-02T21:09:43.659" v="752" actId="33524"/>
-          <ac:spMkLst>
-            <pc:docMk/>
-            <pc:sldMk cId="402239867" sldId="259"/>
-            <ac:spMk id="3" creationId="{0EA8E24A-0CF7-4A10-AE03-31051A9A741D}"/>
-          </ac:spMkLst>
-        </pc:spChg>
-      </pc:sldChg>
-      <pc:sldChg chg="modSp">
-        <pc:chgData name="Tony Fong" userId="ee6c827c74d45d47" providerId="LiveId" clId="{BEF34360-C258-4187-B032-9A1850E3CE0F}" dt="2021-10-02T21:09:00.465" v="751" actId="20577"/>
-        <pc:sldMkLst>
-          <pc:docMk/>
-          <pc:sldMk cId="3293945828" sldId="260"/>
-        </pc:sldMkLst>
-        <pc:graphicFrameChg chg="mod">
-          <ac:chgData name="Tony Fong" userId="ee6c827c74d45d47" providerId="LiveId" clId="{BEF34360-C258-4187-B032-9A1850E3CE0F}" dt="2021-10-02T21:09:00.465" v="751" actId="20577"/>
-          <ac:graphicFrameMkLst>
-            <pc:docMk/>
-            <pc:sldMk cId="3293945828" sldId="260"/>
-            <ac:graphicFrameMk id="4" creationId="{0E923FC6-18BE-452E-B748-3B6F1837EF45}"/>
-          </ac:graphicFrameMkLst>
-        </pc:graphicFrameChg>
-      </pc:sldChg>
-      <pc:sldChg chg="modSp mod">
-        <pc:chgData name="Tony Fong" userId="ee6c827c74d45d47" providerId="LiveId" clId="{BEF34360-C258-4187-B032-9A1850E3CE0F}" dt="2021-10-02T21:07:54.792" v="735" actId="20577"/>
-        <pc:sldMkLst>
-          <pc:docMk/>
-          <pc:sldMk cId="643625227" sldId="262"/>
-        </pc:sldMkLst>
-        <pc:spChg chg="mod">
-          <ac:chgData name="Tony Fong" userId="ee6c827c74d45d47" providerId="LiveId" clId="{BEF34360-C258-4187-B032-9A1850E3CE0F}" dt="2021-10-02T21:07:54.792" v="735" actId="20577"/>
-          <ac:spMkLst>
-            <pc:docMk/>
-            <pc:sldMk cId="643625227" sldId="262"/>
-            <ac:spMk id="3" creationId="{F0DC19AF-77BD-41ED-8343-39EC58B4EA6F}"/>
-          </ac:spMkLst>
-        </pc:spChg>
-      </pc:sldChg>
-      <pc:sldChg chg="modSp mod">
-        <pc:chgData name="Tony Fong" userId="ee6c827c74d45d47" providerId="LiveId" clId="{BEF34360-C258-4187-B032-9A1850E3CE0F}" dt="2021-10-02T21:02:56.379" v="437" actId="20577"/>
-        <pc:sldMkLst>
-          <pc:docMk/>
-          <pc:sldMk cId="2737941546" sldId="263"/>
-        </pc:sldMkLst>
-        <pc:spChg chg="mod">
-          <ac:chgData name="Tony Fong" userId="ee6c827c74d45d47" providerId="LiveId" clId="{BEF34360-C258-4187-B032-9A1850E3CE0F}" dt="2021-10-02T21:02:56.379" v="437" actId="20577"/>
-          <ac:spMkLst>
-            <pc:docMk/>
-            <pc:sldMk cId="2737941546" sldId="263"/>
-            <ac:spMk id="3" creationId="{01A004B9-0C4D-4760-ABDE-69A7109E3584}"/>
-          </ac:spMkLst>
-        </pc:spChg>
-      </pc:sldChg>
-      <pc:sldChg chg="modSp">
-        <pc:chgData name="Tony Fong" userId="ee6c827c74d45d47" providerId="LiveId" clId="{BEF34360-C258-4187-B032-9A1850E3CE0F}" dt="2021-10-02T21:08:52.553" v="743" actId="20577"/>
-        <pc:sldMkLst>
-          <pc:docMk/>
-          <pc:sldMk cId="1447731923" sldId="264"/>
-        </pc:sldMkLst>
-        <pc:graphicFrameChg chg="mod">
-          <ac:chgData name="Tony Fong" userId="ee6c827c74d45d47" providerId="LiveId" clId="{BEF34360-C258-4187-B032-9A1850E3CE0F}" dt="2021-10-02T21:08:52.553" v="743" actId="20577"/>
-          <ac:graphicFrameMkLst>
-            <pc:docMk/>
-            <pc:sldMk cId="1447731923" sldId="264"/>
-            <ac:graphicFrameMk id="4" creationId="{84737A63-B4F0-4305-8A9F-7F005FE47CC5}"/>
-          </ac:graphicFrameMkLst>
-        </pc:graphicFrameChg>
-      </pc:sldChg>
-    </pc:docChg>
-  </pc:docChgLst>
   <pc:docChgLst>
     <pc:chgData name="Tony Fong" userId="ee6c827c74d45d47" providerId="LiveId" clId="{4A92030A-D055-464D-84EC-F6BBC72E9959}"/>
     <pc:docChg chg="undo custSel addSld delSld modSld sldOrd">
@@ -575,6 +422,159 @@
       </pc:sldChg>
     </pc:docChg>
   </pc:docChgLst>
+  <pc:docChgLst>
+    <pc:chgData name="Tony Fong" userId="ee6c827c74d45d47" providerId="LiveId" clId="{BEF34360-C258-4187-B032-9A1850E3CE0F}"/>
+    <pc:docChg chg="custSel modSld">
+      <pc:chgData name="Tony Fong" userId="ee6c827c74d45d47" providerId="LiveId" clId="{BEF34360-C258-4187-B032-9A1850E3CE0F}" dt="2021-10-04T18:34:13.236" v="779" actId="20577"/>
+      <pc:docMkLst>
+        <pc:docMk/>
+      </pc:docMkLst>
+      <pc:sldChg chg="modSp mod">
+        <pc:chgData name="Tony Fong" userId="ee6c827c74d45d47" providerId="LiveId" clId="{BEF34360-C258-4187-B032-9A1850E3CE0F}" dt="2021-10-02T21:07:07.464" v="696" actId="20577"/>
+        <pc:sldMkLst>
+          <pc:docMk/>
+          <pc:sldMk cId="2422413286" sldId="257"/>
+        </pc:sldMkLst>
+        <pc:spChg chg="mod">
+          <ac:chgData name="Tony Fong" userId="ee6c827c74d45d47" providerId="LiveId" clId="{BEF34360-C258-4187-B032-9A1850E3CE0F}" dt="2021-10-02T21:07:07.464" v="696" actId="20577"/>
+          <ac:spMkLst>
+            <pc:docMk/>
+            <pc:sldMk cId="2422413286" sldId="257"/>
+            <ac:spMk id="3" creationId="{E3590B9D-D67A-4C40-AE59-0EEF31F4BF99}"/>
+          </ac:spMkLst>
+        </pc:spChg>
+      </pc:sldChg>
+      <pc:sldChg chg="modSp mod">
+        <pc:chgData name="Tony Fong" userId="ee6c827c74d45d47" providerId="LiveId" clId="{BEF34360-C258-4187-B032-9A1850E3CE0F}" dt="2021-10-04T18:34:13.236" v="779" actId="20577"/>
+        <pc:sldMkLst>
+          <pc:docMk/>
+          <pc:sldMk cId="987459327" sldId="258"/>
+        </pc:sldMkLst>
+        <pc:spChg chg="mod">
+          <ac:chgData name="Tony Fong" userId="ee6c827c74d45d47" providerId="LiveId" clId="{BEF34360-C258-4187-B032-9A1850E3CE0F}" dt="2021-10-04T18:34:13.236" v="779" actId="20577"/>
+          <ac:spMkLst>
+            <pc:docMk/>
+            <pc:sldMk cId="987459327" sldId="258"/>
+            <ac:spMk id="3" creationId="{19A78F9D-CFFD-41FB-8546-D14F05FD77BC}"/>
+          </ac:spMkLst>
+        </pc:spChg>
+      </pc:sldChg>
+      <pc:sldChg chg="modSp mod">
+        <pc:chgData name="Tony Fong" userId="ee6c827c74d45d47" providerId="LiveId" clId="{BEF34360-C258-4187-B032-9A1850E3CE0F}" dt="2021-10-02T21:09:43.659" v="752" actId="33524"/>
+        <pc:sldMkLst>
+          <pc:docMk/>
+          <pc:sldMk cId="402239867" sldId="259"/>
+        </pc:sldMkLst>
+        <pc:spChg chg="mod">
+          <ac:chgData name="Tony Fong" userId="ee6c827c74d45d47" providerId="LiveId" clId="{BEF34360-C258-4187-B032-9A1850E3CE0F}" dt="2021-10-02T21:09:43.659" v="752" actId="33524"/>
+          <ac:spMkLst>
+            <pc:docMk/>
+            <pc:sldMk cId="402239867" sldId="259"/>
+            <ac:spMk id="3" creationId="{0EA8E24A-0CF7-4A10-AE03-31051A9A741D}"/>
+          </ac:spMkLst>
+        </pc:spChg>
+      </pc:sldChg>
+      <pc:sldChg chg="modSp">
+        <pc:chgData name="Tony Fong" userId="ee6c827c74d45d47" providerId="LiveId" clId="{BEF34360-C258-4187-B032-9A1850E3CE0F}" dt="2021-10-02T21:09:00.465" v="751" actId="20577"/>
+        <pc:sldMkLst>
+          <pc:docMk/>
+          <pc:sldMk cId="3293945828" sldId="260"/>
+        </pc:sldMkLst>
+        <pc:graphicFrameChg chg="mod">
+          <ac:chgData name="Tony Fong" userId="ee6c827c74d45d47" providerId="LiveId" clId="{BEF34360-C258-4187-B032-9A1850E3CE0F}" dt="2021-10-02T21:09:00.465" v="751" actId="20577"/>
+          <ac:graphicFrameMkLst>
+            <pc:docMk/>
+            <pc:sldMk cId="3293945828" sldId="260"/>
+            <ac:graphicFrameMk id="4" creationId="{0E923FC6-18BE-452E-B748-3B6F1837EF45}"/>
+          </ac:graphicFrameMkLst>
+        </pc:graphicFrameChg>
+      </pc:sldChg>
+      <pc:sldChg chg="modSp mod">
+        <pc:chgData name="Tony Fong" userId="ee6c827c74d45d47" providerId="LiveId" clId="{BEF34360-C258-4187-B032-9A1850E3CE0F}" dt="2021-10-02T21:07:54.792" v="735" actId="20577"/>
+        <pc:sldMkLst>
+          <pc:docMk/>
+          <pc:sldMk cId="643625227" sldId="262"/>
+        </pc:sldMkLst>
+        <pc:spChg chg="mod">
+          <ac:chgData name="Tony Fong" userId="ee6c827c74d45d47" providerId="LiveId" clId="{BEF34360-C258-4187-B032-9A1850E3CE0F}" dt="2021-10-02T21:07:54.792" v="735" actId="20577"/>
+          <ac:spMkLst>
+            <pc:docMk/>
+            <pc:sldMk cId="643625227" sldId="262"/>
+            <ac:spMk id="3" creationId="{F0DC19AF-77BD-41ED-8343-39EC58B4EA6F}"/>
+          </ac:spMkLst>
+        </pc:spChg>
+      </pc:sldChg>
+      <pc:sldChg chg="modSp mod">
+        <pc:chgData name="Tony Fong" userId="ee6c827c74d45d47" providerId="LiveId" clId="{BEF34360-C258-4187-B032-9A1850E3CE0F}" dt="2021-10-02T21:02:56.379" v="437" actId="20577"/>
+        <pc:sldMkLst>
+          <pc:docMk/>
+          <pc:sldMk cId="2737941546" sldId="263"/>
+        </pc:sldMkLst>
+        <pc:spChg chg="mod">
+          <ac:chgData name="Tony Fong" userId="ee6c827c74d45d47" providerId="LiveId" clId="{BEF34360-C258-4187-B032-9A1850E3CE0F}" dt="2021-10-02T21:02:56.379" v="437" actId="20577"/>
+          <ac:spMkLst>
+            <pc:docMk/>
+            <pc:sldMk cId="2737941546" sldId="263"/>
+            <ac:spMk id="3" creationId="{01A004B9-0C4D-4760-ABDE-69A7109E3584}"/>
+          </ac:spMkLst>
+        </pc:spChg>
+      </pc:sldChg>
+      <pc:sldChg chg="modSp">
+        <pc:chgData name="Tony Fong" userId="ee6c827c74d45d47" providerId="LiveId" clId="{BEF34360-C258-4187-B032-9A1850E3CE0F}" dt="2021-10-02T21:08:52.553" v="743" actId="20577"/>
+        <pc:sldMkLst>
+          <pc:docMk/>
+          <pc:sldMk cId="1447731923" sldId="264"/>
+        </pc:sldMkLst>
+        <pc:graphicFrameChg chg="mod">
+          <ac:chgData name="Tony Fong" userId="ee6c827c74d45d47" providerId="LiveId" clId="{BEF34360-C258-4187-B032-9A1850E3CE0F}" dt="2021-10-02T21:08:52.553" v="743" actId="20577"/>
+          <ac:graphicFrameMkLst>
+            <pc:docMk/>
+            <pc:sldMk cId="1447731923" sldId="264"/>
+            <ac:graphicFrameMk id="4" creationId="{84737A63-B4F0-4305-8A9F-7F005FE47CC5}"/>
+          </ac:graphicFrameMkLst>
+        </pc:graphicFrameChg>
+      </pc:sldChg>
+    </pc:docChg>
+  </pc:docChgLst>
+  <pc:docChgLst>
+    <pc:chgData name="Tony Fong" userId="ee6c827c74d45d47" providerId="LiveId" clId="{EA513785-A88E-45FF-9E88-79EB89A826A0}"/>
+    <pc:docChg chg="undo custSel modSld">
+      <pc:chgData name="Tony Fong" userId="ee6c827c74d45d47" providerId="LiveId" clId="{EA513785-A88E-45FF-9E88-79EB89A826A0}" dt="2021-10-19T19:46:50.820" v="50" actId="6549"/>
+      <pc:docMkLst>
+        <pc:docMk/>
+      </pc:docMkLst>
+      <pc:sldChg chg="modSp mod">
+        <pc:chgData name="Tony Fong" userId="ee6c827c74d45d47" providerId="LiveId" clId="{EA513785-A88E-45FF-9E88-79EB89A826A0}" dt="2021-10-19T19:46:50.820" v="50" actId="6549"/>
+        <pc:sldMkLst>
+          <pc:docMk/>
+          <pc:sldMk cId="2422413286" sldId="257"/>
+        </pc:sldMkLst>
+        <pc:spChg chg="mod">
+          <ac:chgData name="Tony Fong" userId="ee6c827c74d45d47" providerId="LiveId" clId="{EA513785-A88E-45FF-9E88-79EB89A826A0}" dt="2021-10-19T19:46:50.820" v="50" actId="6549"/>
+          <ac:spMkLst>
+            <pc:docMk/>
+            <pc:sldMk cId="2422413286" sldId="257"/>
+            <ac:spMk id="2" creationId="{25F644BA-AEF0-4483-A5A6-AC31D85173A2}"/>
+          </ac:spMkLst>
+        </pc:spChg>
+      </pc:sldChg>
+      <pc:sldChg chg="modSp mod">
+        <pc:chgData name="Tony Fong" userId="ee6c827c74d45d47" providerId="LiveId" clId="{EA513785-A88E-45FF-9E88-79EB89A826A0}" dt="2021-10-19T19:45:55.781" v="15" actId="20577"/>
+        <pc:sldMkLst>
+          <pc:docMk/>
+          <pc:sldMk cId="2737941546" sldId="263"/>
+        </pc:sldMkLst>
+        <pc:spChg chg="mod">
+          <ac:chgData name="Tony Fong" userId="ee6c827c74d45d47" providerId="LiveId" clId="{EA513785-A88E-45FF-9E88-79EB89A826A0}" dt="2021-10-19T19:45:55.781" v="15" actId="20577"/>
+          <ac:spMkLst>
+            <pc:docMk/>
+            <pc:sldMk cId="2737941546" sldId="263"/>
+            <ac:spMk id="3" creationId="{01A004B9-0C4D-4760-ABDE-69A7109E3584}"/>
+          </ac:spMkLst>
+        </pc:spChg>
+      </pc:sldChg>
+    </pc:docChg>
+  </pc:docChgLst>
 </pc:chgInfo>
 </file>
 
@@ -4844,7 +4844,7 @@
           <a:p>
             <a:fld id="{DEB8CC5E-228A-4C0B-BBD2-1A5E3294DA3F}" type="datetimeFigureOut">
               <a:rPr lang="en-US" smtClean="0"/>
-              <a:t>10/19/2021</a:t>
+              <a:t>10/27/2021</a:t>
             </a:fld>
             <a:endParaRPr lang="en-US"/>
           </a:p>
@@ -5800,7 +5800,7 @@
           <a:p>
             <a:fld id="{3C3DA7E3-62A7-4D7B-BA7A-D4208150B0D3}" type="datetimeFigureOut">
               <a:rPr lang="en-US" smtClean="0"/>
-              <a:t>10/19/2021</a:t>
+              <a:t>10/27/2021</a:t>
             </a:fld>
             <a:endParaRPr lang="en-US"/>
           </a:p>
@@ -5998,7 +5998,7 @@
           <a:p>
             <a:fld id="{3C3DA7E3-62A7-4D7B-BA7A-D4208150B0D3}" type="datetimeFigureOut">
               <a:rPr lang="en-US" smtClean="0"/>
-              <a:t>10/19/2021</a:t>
+              <a:t>10/27/2021</a:t>
             </a:fld>
             <a:endParaRPr lang="en-US"/>
           </a:p>
@@ -6206,7 +6206,7 @@
           <a:p>
             <a:fld id="{3C3DA7E3-62A7-4D7B-BA7A-D4208150B0D3}" type="datetimeFigureOut">
               <a:rPr lang="en-US" smtClean="0"/>
-              <a:t>10/19/2021</a:t>
+              <a:t>10/27/2021</a:t>
             </a:fld>
             <a:endParaRPr lang="en-US"/>
           </a:p>
@@ -6404,7 +6404,7 @@
           <a:p>
             <a:fld id="{3C3DA7E3-62A7-4D7B-BA7A-D4208150B0D3}" type="datetimeFigureOut">
               <a:rPr lang="en-US" smtClean="0"/>
-              <a:t>10/19/2021</a:t>
+              <a:t>10/27/2021</a:t>
             </a:fld>
             <a:endParaRPr lang="en-US"/>
           </a:p>
@@ -6679,7 +6679,7 @@
           <a:p>
             <a:fld id="{3C3DA7E3-62A7-4D7B-BA7A-D4208150B0D3}" type="datetimeFigureOut">
               <a:rPr lang="en-US" smtClean="0"/>
-              <a:t>10/19/2021</a:t>
+              <a:t>10/27/2021</a:t>
             </a:fld>
             <a:endParaRPr lang="en-US"/>
           </a:p>
@@ -6944,7 +6944,7 @@
           <a:p>
             <a:fld id="{3C3DA7E3-62A7-4D7B-BA7A-D4208150B0D3}" type="datetimeFigureOut">
               <a:rPr lang="en-US" smtClean="0"/>
-              <a:t>10/19/2021</a:t>
+              <a:t>10/27/2021</a:t>
             </a:fld>
             <a:endParaRPr lang="en-US"/>
           </a:p>
@@ -7356,7 +7356,7 @@
           <a:p>
             <a:fld id="{3C3DA7E3-62A7-4D7B-BA7A-D4208150B0D3}" type="datetimeFigureOut">
               <a:rPr lang="en-US" smtClean="0"/>
-              <a:t>10/19/2021</a:t>
+              <a:t>10/27/2021</a:t>
             </a:fld>
             <a:endParaRPr lang="en-US"/>
           </a:p>
@@ -7497,7 +7497,7 @@
           <a:p>
             <a:fld id="{3C3DA7E3-62A7-4D7B-BA7A-D4208150B0D3}" type="datetimeFigureOut">
               <a:rPr lang="en-US" smtClean="0"/>
-              <a:t>10/19/2021</a:t>
+              <a:t>10/27/2021</a:t>
             </a:fld>
             <a:endParaRPr lang="en-US"/>
           </a:p>
@@ -7610,7 +7610,7 @@
           <a:p>
             <a:fld id="{3C3DA7E3-62A7-4D7B-BA7A-D4208150B0D3}" type="datetimeFigureOut">
               <a:rPr lang="en-US" smtClean="0"/>
-              <a:t>10/19/2021</a:t>
+              <a:t>10/27/2021</a:t>
             </a:fld>
             <a:endParaRPr lang="en-US"/>
           </a:p>
@@ -7921,7 +7921,7 @@
           <a:p>
             <a:fld id="{3C3DA7E3-62A7-4D7B-BA7A-D4208150B0D3}" type="datetimeFigureOut">
               <a:rPr lang="en-US" smtClean="0"/>
-              <a:t>10/19/2021</a:t>
+              <a:t>10/27/2021</a:t>
             </a:fld>
             <a:endParaRPr lang="en-US"/>
           </a:p>
@@ -8209,7 +8209,7 @@
           <a:p>
             <a:fld id="{3C3DA7E3-62A7-4D7B-BA7A-D4208150B0D3}" type="datetimeFigureOut">
               <a:rPr lang="en-US" smtClean="0"/>
-              <a:t>10/19/2021</a:t>
+              <a:t>10/27/2021</a:t>
             </a:fld>
             <a:endParaRPr lang="en-US"/>
           </a:p>
@@ -8450,7 +8450,7 @@
           <a:p>
             <a:fld id="{3C3DA7E3-62A7-4D7B-BA7A-D4208150B0D3}" type="datetimeFigureOut">
               <a:rPr lang="en-US" smtClean="0"/>
-              <a:t>10/19/2021</a:t>
+              <a:t>10/27/2021</a:t>
             </a:fld>
             <a:endParaRPr lang="en-US"/>
           </a:p>
@@ -9115,8 +9115,13 @@
           <a:p>
             <a:r>
               <a:rPr lang="en-US" dirty="0"/>
-              <a:t>Hold events/promotions during the summer months to attract more casual riders</a:t>
-            </a:r>
+              <a:t>Hold events/promotions during the summer months to convert casual riders to </a:t>
+            </a:r>
+            <a:r>
+              <a:rPr lang="en-US"/>
+              <a:t>become members</a:t>
+            </a:r>
+            <a:endParaRPr lang="en-US" dirty="0"/>
           </a:p>
           <a:p>
             <a:r>

</xml_diff>